<commit_message>
Remove label from MS objects
</commit_message>
<xml_diff>
--- a/tools/SemanticModelAudit/report/SemanticModelAuditReportBackgrounds.pptx
+++ b/tools/SemanticModelAudit/report/SemanticModelAuditReportBackgrounds.pptx
@@ -2,14 +2,14 @@
 <file path=ppt/presentation.xml><?xml version="1.0" encoding="utf-8"?>
 <p:presentation xmlns:a="http://schemas.openxmlformats.org/drawingml/2006/main" xmlns:r="http://schemas.openxmlformats.org/officeDocument/2006/relationships" xmlns:p="http://schemas.openxmlformats.org/presentationml/2006/main" saveSubsetFonts="1">
   <p:sldMasterIdLst>
-    <p:sldMasterId id="2147483648" r:id="rId4"/>
+    <p:sldMasterId id="2147483648" r:id="rId1"/>
   </p:sldMasterIdLst>
   <p:notesMasterIdLst>
-    <p:notesMasterId r:id="rId7"/>
+    <p:notesMasterId r:id="rId4"/>
   </p:notesMasterIdLst>
   <p:sldIdLst>
-    <p:sldId id="261" r:id="rId5"/>
-    <p:sldId id="260" r:id="rId6"/>
+    <p:sldId id="261" r:id="rId2"/>
+    <p:sldId id="260" r:id="rId3"/>
   </p:sldIdLst>
   <p:sldSz cx="12192000" cy="6858000"/>
   <p:notesSz cx="6858000" cy="9144000"/>
@@ -196,9 +196,9 @@
             </a:lvl1pPr>
           </a:lstStyle>
           <a:p>
-            <a:fld id="{4465708F-0121-4FD8-BC58-BE65781798FF}" type="datetimeFigureOut">
+            <a:fld id="{84B1CC70-1517-4D02-A712-9E68AF87EA56}" type="datetimeFigureOut">
               <a:rPr lang="en-US" smtClean="0"/>
-              <a:t>3/10/2025</a:t>
+              <a:t>3/19/2025</a:t>
             </a:fld>
             <a:endParaRPr lang="en-US"/>
           </a:p>
@@ -354,7 +354,7 @@
             </a:lvl1pPr>
           </a:lstStyle>
           <a:p>
-            <a:fld id="{27E99D4D-2AB2-47D6-BAF1-BBC8FBF7B873}" type="slidenum">
+            <a:fld id="{8F5C0B12-DAC4-4A49-8383-67B23201A772}" type="slidenum">
               <a:rPr lang="en-US" smtClean="0"/>
               <a:t>‹#›</a:t>
             </a:fld>
@@ -365,7 +365,7 @@
     </p:spTree>
     <p:extLst>
       <p:ext uri="{BB962C8B-B14F-4D97-AF65-F5344CB8AC3E}">
-        <p14:creationId xmlns:p14="http://schemas.microsoft.com/office/powerpoint/2010/main" val="1959313489"/>
+        <p14:creationId xmlns:p14="http://schemas.microsoft.com/office/powerpoint/2010/main" val="306080217"/>
       </p:ext>
     </p:extLst>
   </p:cSld>
@@ -679,7 +679,7 @@
           <p:cNvPr id="2" name="Title 1">
             <a:extLst>
               <a:ext uri="{FF2B5EF4-FFF2-40B4-BE49-F238E27FC236}">
-                <a16:creationId xmlns:a16="http://schemas.microsoft.com/office/drawing/2014/main" id="{741A72E4-C579-DE7F-8634-3C072460A8E2}"/>
+                <a16:creationId xmlns:a16="http://schemas.microsoft.com/office/drawing/2014/main" id="{6F2B386B-F506-1C94-7967-AFC6A834CF19}"/>
               </a:ext>
             </a:extLst>
           </p:cNvPr>
@@ -716,7 +716,7 @@
           <p:cNvPr id="3" name="Subtitle 2">
             <a:extLst>
               <a:ext uri="{FF2B5EF4-FFF2-40B4-BE49-F238E27FC236}">
-                <a16:creationId xmlns:a16="http://schemas.microsoft.com/office/drawing/2014/main" id="{151F37CA-302C-EDE1-ACFA-1ACE07C5FDBB}"/>
+                <a16:creationId xmlns:a16="http://schemas.microsoft.com/office/drawing/2014/main" id="{1F09A7D3-3902-6F52-048C-C24DE6A53370}"/>
               </a:ext>
             </a:extLst>
           </p:cNvPr>
@@ -786,7 +786,7 @@
           <p:cNvPr id="4" name="Date Placeholder 3">
             <a:extLst>
               <a:ext uri="{FF2B5EF4-FFF2-40B4-BE49-F238E27FC236}">
-                <a16:creationId xmlns:a16="http://schemas.microsoft.com/office/drawing/2014/main" id="{96B391F3-5BDF-DF95-C6D9-D838EF990C2D}"/>
+                <a16:creationId xmlns:a16="http://schemas.microsoft.com/office/drawing/2014/main" id="{C2F9A3A0-2E69-12E6-A8C0-A389CDDC5C0B}"/>
               </a:ext>
             </a:extLst>
           </p:cNvPr>
@@ -802,9 +802,9 @@
           <a:bodyPr/>
           <a:lstStyle/>
           <a:p>
-            <a:fld id="{CCDA7376-EEC0-46C7-9DFC-2C36E4C00015}" type="datetimeFigureOut">
+            <a:fld id="{D0427CD7-63F2-45BE-9E95-E93FC6C04848}" type="datetimeFigureOut">
               <a:rPr lang="en-US" smtClean="0"/>
-              <a:t>3/10/2025</a:t>
+              <a:t>3/19/2025</a:t>
             </a:fld>
             <a:endParaRPr lang="en-US"/>
           </a:p>
@@ -815,7 +815,7 @@
           <p:cNvPr id="5" name="Footer Placeholder 4">
             <a:extLst>
               <a:ext uri="{FF2B5EF4-FFF2-40B4-BE49-F238E27FC236}">
-                <a16:creationId xmlns:a16="http://schemas.microsoft.com/office/drawing/2014/main" id="{33398E9F-E3CD-66BA-FFCF-6DA635BE889A}"/>
+                <a16:creationId xmlns:a16="http://schemas.microsoft.com/office/drawing/2014/main" id="{DF78C151-BCB1-EED2-C05F-0A30E9372E5A}"/>
               </a:ext>
             </a:extLst>
           </p:cNvPr>
@@ -840,7 +840,7 @@
           <p:cNvPr id="6" name="Slide Number Placeholder 5">
             <a:extLst>
               <a:ext uri="{FF2B5EF4-FFF2-40B4-BE49-F238E27FC236}">
-                <a16:creationId xmlns:a16="http://schemas.microsoft.com/office/drawing/2014/main" id="{BEB8AEB7-837F-DE2E-183D-1EE042F44FD9}"/>
+                <a16:creationId xmlns:a16="http://schemas.microsoft.com/office/drawing/2014/main" id="{AA20D79C-C7D3-D185-4DAA-2A18F2F04835}"/>
               </a:ext>
             </a:extLst>
           </p:cNvPr>
@@ -856,7 +856,7 @@
           <a:bodyPr/>
           <a:lstStyle/>
           <a:p>
-            <a:fld id="{2A864CAC-480C-453A-B2B7-EA02CF3A7769}" type="slidenum">
+            <a:fld id="{A574171A-7688-4A0F-8841-E08B9AE9B78E}" type="slidenum">
               <a:rPr lang="en-US" smtClean="0"/>
               <a:t>‹#›</a:t>
             </a:fld>
@@ -867,7 +867,7 @@
     </p:spTree>
     <p:extLst>
       <p:ext uri="{BB962C8B-B14F-4D97-AF65-F5344CB8AC3E}">
-        <p14:creationId xmlns:p14="http://schemas.microsoft.com/office/powerpoint/2010/main" val="79786951"/>
+        <p14:creationId xmlns:p14="http://schemas.microsoft.com/office/powerpoint/2010/main" val="2285557839"/>
       </p:ext>
     </p:extLst>
   </p:cSld>
@@ -899,7 +899,7 @@
           <p:cNvPr id="2" name="Title 1">
             <a:extLst>
               <a:ext uri="{FF2B5EF4-FFF2-40B4-BE49-F238E27FC236}">
-                <a16:creationId xmlns:a16="http://schemas.microsoft.com/office/drawing/2014/main" id="{7E2E0F09-16A8-5F6B-ED2F-5B731778347D}"/>
+                <a16:creationId xmlns:a16="http://schemas.microsoft.com/office/drawing/2014/main" id="{2A575DE9-865D-9EAD-B4EE-BD0FB7CBCE4A}"/>
               </a:ext>
             </a:extLst>
           </p:cNvPr>
@@ -927,7 +927,7 @@
           <p:cNvPr id="3" name="Vertical Text Placeholder 2">
             <a:extLst>
               <a:ext uri="{FF2B5EF4-FFF2-40B4-BE49-F238E27FC236}">
-                <a16:creationId xmlns:a16="http://schemas.microsoft.com/office/drawing/2014/main" id="{E4B255CF-40C7-61BD-7840-AE6A9375FEC7}"/>
+                <a16:creationId xmlns:a16="http://schemas.microsoft.com/office/drawing/2014/main" id="{5A0264A7-2782-179C-8B2A-280000EC1692}"/>
               </a:ext>
             </a:extLst>
           </p:cNvPr>
@@ -984,7 +984,7 @@
           <p:cNvPr id="4" name="Date Placeholder 3">
             <a:extLst>
               <a:ext uri="{FF2B5EF4-FFF2-40B4-BE49-F238E27FC236}">
-                <a16:creationId xmlns:a16="http://schemas.microsoft.com/office/drawing/2014/main" id="{4559FEFC-2A27-DB7B-D26D-00D24A486BFD}"/>
+                <a16:creationId xmlns:a16="http://schemas.microsoft.com/office/drawing/2014/main" id="{93FA820B-83E8-E357-D7E7-99E91A256015}"/>
               </a:ext>
             </a:extLst>
           </p:cNvPr>
@@ -1000,9 +1000,9 @@
           <a:bodyPr/>
           <a:lstStyle/>
           <a:p>
-            <a:fld id="{CCDA7376-EEC0-46C7-9DFC-2C36E4C00015}" type="datetimeFigureOut">
+            <a:fld id="{D0427CD7-63F2-45BE-9E95-E93FC6C04848}" type="datetimeFigureOut">
               <a:rPr lang="en-US" smtClean="0"/>
-              <a:t>3/10/2025</a:t>
+              <a:t>3/19/2025</a:t>
             </a:fld>
             <a:endParaRPr lang="en-US"/>
           </a:p>
@@ -1013,7 +1013,7 @@
           <p:cNvPr id="5" name="Footer Placeholder 4">
             <a:extLst>
               <a:ext uri="{FF2B5EF4-FFF2-40B4-BE49-F238E27FC236}">
-                <a16:creationId xmlns:a16="http://schemas.microsoft.com/office/drawing/2014/main" id="{10EEA0BD-BADB-2AC5-AC2F-5E7931002B96}"/>
+                <a16:creationId xmlns:a16="http://schemas.microsoft.com/office/drawing/2014/main" id="{3D89D4AA-1713-1B12-091C-91888FA28CDE}"/>
               </a:ext>
             </a:extLst>
           </p:cNvPr>
@@ -1038,7 +1038,7 @@
           <p:cNvPr id="6" name="Slide Number Placeholder 5">
             <a:extLst>
               <a:ext uri="{FF2B5EF4-FFF2-40B4-BE49-F238E27FC236}">
-                <a16:creationId xmlns:a16="http://schemas.microsoft.com/office/drawing/2014/main" id="{372107C6-1C9C-89C1-A371-9E2C84EACF3A}"/>
+                <a16:creationId xmlns:a16="http://schemas.microsoft.com/office/drawing/2014/main" id="{6384A880-A87E-048C-382D-A9DBED3EC7BC}"/>
               </a:ext>
             </a:extLst>
           </p:cNvPr>
@@ -1054,7 +1054,7 @@
           <a:bodyPr/>
           <a:lstStyle/>
           <a:p>
-            <a:fld id="{2A864CAC-480C-453A-B2B7-EA02CF3A7769}" type="slidenum">
+            <a:fld id="{A574171A-7688-4A0F-8841-E08B9AE9B78E}" type="slidenum">
               <a:rPr lang="en-US" smtClean="0"/>
               <a:t>‹#›</a:t>
             </a:fld>
@@ -1065,7 +1065,7 @@
     </p:spTree>
     <p:extLst>
       <p:ext uri="{BB962C8B-B14F-4D97-AF65-F5344CB8AC3E}">
-        <p14:creationId xmlns:p14="http://schemas.microsoft.com/office/powerpoint/2010/main" val="660750870"/>
+        <p14:creationId xmlns:p14="http://schemas.microsoft.com/office/powerpoint/2010/main" val="3247210749"/>
       </p:ext>
     </p:extLst>
   </p:cSld>
@@ -1097,7 +1097,7 @@
           <p:cNvPr id="2" name="Vertical Title 1">
             <a:extLst>
               <a:ext uri="{FF2B5EF4-FFF2-40B4-BE49-F238E27FC236}">
-                <a16:creationId xmlns:a16="http://schemas.microsoft.com/office/drawing/2014/main" id="{042D68B4-8D18-CC61-17A1-894F22A45B5C}"/>
+                <a16:creationId xmlns:a16="http://schemas.microsoft.com/office/drawing/2014/main" id="{29F367CA-4B92-9391-5990-1847F4B0B17A}"/>
               </a:ext>
             </a:extLst>
           </p:cNvPr>
@@ -1130,7 +1130,7 @@
           <p:cNvPr id="3" name="Vertical Text Placeholder 2">
             <a:extLst>
               <a:ext uri="{FF2B5EF4-FFF2-40B4-BE49-F238E27FC236}">
-                <a16:creationId xmlns:a16="http://schemas.microsoft.com/office/drawing/2014/main" id="{2E4D66B6-F360-0B4B-1C23-55E5BC7BF8F6}"/>
+                <a16:creationId xmlns:a16="http://schemas.microsoft.com/office/drawing/2014/main" id="{7F37AD2D-DCBA-4663-4490-C59A6975AB8D}"/>
               </a:ext>
             </a:extLst>
           </p:cNvPr>
@@ -1192,7 +1192,7 @@
           <p:cNvPr id="4" name="Date Placeholder 3">
             <a:extLst>
               <a:ext uri="{FF2B5EF4-FFF2-40B4-BE49-F238E27FC236}">
-                <a16:creationId xmlns:a16="http://schemas.microsoft.com/office/drawing/2014/main" id="{083F30CB-416E-350E-1F52-38FEA82C553E}"/>
+                <a16:creationId xmlns:a16="http://schemas.microsoft.com/office/drawing/2014/main" id="{7A98E126-0EC9-35CD-6BFB-CEB327FEB43A}"/>
               </a:ext>
             </a:extLst>
           </p:cNvPr>
@@ -1208,9 +1208,9 @@
           <a:bodyPr/>
           <a:lstStyle/>
           <a:p>
-            <a:fld id="{CCDA7376-EEC0-46C7-9DFC-2C36E4C00015}" type="datetimeFigureOut">
+            <a:fld id="{D0427CD7-63F2-45BE-9E95-E93FC6C04848}" type="datetimeFigureOut">
               <a:rPr lang="en-US" smtClean="0"/>
-              <a:t>3/10/2025</a:t>
+              <a:t>3/19/2025</a:t>
             </a:fld>
             <a:endParaRPr lang="en-US"/>
           </a:p>
@@ -1221,7 +1221,7 @@
           <p:cNvPr id="5" name="Footer Placeholder 4">
             <a:extLst>
               <a:ext uri="{FF2B5EF4-FFF2-40B4-BE49-F238E27FC236}">
-                <a16:creationId xmlns:a16="http://schemas.microsoft.com/office/drawing/2014/main" id="{80C29A50-18C5-B5DC-1484-C4A36E565EED}"/>
+                <a16:creationId xmlns:a16="http://schemas.microsoft.com/office/drawing/2014/main" id="{E160E452-2F85-BC1A-F455-CAD520381484}"/>
               </a:ext>
             </a:extLst>
           </p:cNvPr>
@@ -1246,7 +1246,7 @@
           <p:cNvPr id="6" name="Slide Number Placeholder 5">
             <a:extLst>
               <a:ext uri="{FF2B5EF4-FFF2-40B4-BE49-F238E27FC236}">
-                <a16:creationId xmlns:a16="http://schemas.microsoft.com/office/drawing/2014/main" id="{24FE7614-8682-C727-7DED-F37C7C01AFE2}"/>
+                <a16:creationId xmlns:a16="http://schemas.microsoft.com/office/drawing/2014/main" id="{24F625E5-1ACD-891B-DB3C-563EECD885F0}"/>
               </a:ext>
             </a:extLst>
           </p:cNvPr>
@@ -1262,7 +1262,7 @@
           <a:bodyPr/>
           <a:lstStyle/>
           <a:p>
-            <a:fld id="{2A864CAC-480C-453A-B2B7-EA02CF3A7769}" type="slidenum">
+            <a:fld id="{A574171A-7688-4A0F-8841-E08B9AE9B78E}" type="slidenum">
               <a:rPr lang="en-US" smtClean="0"/>
               <a:t>‹#›</a:t>
             </a:fld>
@@ -1273,7 +1273,7 @@
     </p:spTree>
     <p:extLst>
       <p:ext uri="{BB962C8B-B14F-4D97-AF65-F5344CB8AC3E}">
-        <p14:creationId xmlns:p14="http://schemas.microsoft.com/office/powerpoint/2010/main" val="1289319547"/>
+        <p14:creationId xmlns:p14="http://schemas.microsoft.com/office/powerpoint/2010/main" val="341009853"/>
       </p:ext>
     </p:extLst>
   </p:cSld>
@@ -1305,7 +1305,7 @@
           <p:cNvPr id="2" name="Title 1">
             <a:extLst>
               <a:ext uri="{FF2B5EF4-FFF2-40B4-BE49-F238E27FC236}">
-                <a16:creationId xmlns:a16="http://schemas.microsoft.com/office/drawing/2014/main" id="{400AF42A-4C0F-1FD9-AD0D-8EC5E6BE9F8A}"/>
+                <a16:creationId xmlns:a16="http://schemas.microsoft.com/office/drawing/2014/main" id="{5DBED713-AD13-47DA-27EB-F701E97AB422}"/>
               </a:ext>
             </a:extLst>
           </p:cNvPr>
@@ -1333,7 +1333,7 @@
           <p:cNvPr id="3" name="Content Placeholder 2">
             <a:extLst>
               <a:ext uri="{FF2B5EF4-FFF2-40B4-BE49-F238E27FC236}">
-                <a16:creationId xmlns:a16="http://schemas.microsoft.com/office/drawing/2014/main" id="{393CD276-D220-FCED-1597-B7FBACC3C4A0}"/>
+                <a16:creationId xmlns:a16="http://schemas.microsoft.com/office/drawing/2014/main" id="{EC2DACA7-A885-9A83-3E47-B39CC0CD4147}"/>
               </a:ext>
             </a:extLst>
           </p:cNvPr>
@@ -1390,7 +1390,7 @@
           <p:cNvPr id="4" name="Date Placeholder 3">
             <a:extLst>
               <a:ext uri="{FF2B5EF4-FFF2-40B4-BE49-F238E27FC236}">
-                <a16:creationId xmlns:a16="http://schemas.microsoft.com/office/drawing/2014/main" id="{557A040E-0DE6-475A-8C21-CB7A4E37B899}"/>
+                <a16:creationId xmlns:a16="http://schemas.microsoft.com/office/drawing/2014/main" id="{225DAB0D-5E0C-309C-6393-F4FB816CE843}"/>
               </a:ext>
             </a:extLst>
           </p:cNvPr>
@@ -1406,9 +1406,9 @@
           <a:bodyPr/>
           <a:lstStyle/>
           <a:p>
-            <a:fld id="{CCDA7376-EEC0-46C7-9DFC-2C36E4C00015}" type="datetimeFigureOut">
+            <a:fld id="{D0427CD7-63F2-45BE-9E95-E93FC6C04848}" type="datetimeFigureOut">
               <a:rPr lang="en-US" smtClean="0"/>
-              <a:t>3/10/2025</a:t>
+              <a:t>3/19/2025</a:t>
             </a:fld>
             <a:endParaRPr lang="en-US"/>
           </a:p>
@@ -1419,7 +1419,7 @@
           <p:cNvPr id="5" name="Footer Placeholder 4">
             <a:extLst>
               <a:ext uri="{FF2B5EF4-FFF2-40B4-BE49-F238E27FC236}">
-                <a16:creationId xmlns:a16="http://schemas.microsoft.com/office/drawing/2014/main" id="{30771EDA-C3C1-CEF3-8F35-1C0841F38866}"/>
+                <a16:creationId xmlns:a16="http://schemas.microsoft.com/office/drawing/2014/main" id="{062FAEC4-2786-485E-7B3D-11C53FF56E02}"/>
               </a:ext>
             </a:extLst>
           </p:cNvPr>
@@ -1444,7 +1444,7 @@
           <p:cNvPr id="6" name="Slide Number Placeholder 5">
             <a:extLst>
               <a:ext uri="{FF2B5EF4-FFF2-40B4-BE49-F238E27FC236}">
-                <a16:creationId xmlns:a16="http://schemas.microsoft.com/office/drawing/2014/main" id="{45E7BA49-BD61-A61B-E476-3B63DEF20C80}"/>
+                <a16:creationId xmlns:a16="http://schemas.microsoft.com/office/drawing/2014/main" id="{75B968B4-8862-7C8E-FDFC-9733651EAA2B}"/>
               </a:ext>
             </a:extLst>
           </p:cNvPr>
@@ -1460,7 +1460,7 @@
           <a:bodyPr/>
           <a:lstStyle/>
           <a:p>
-            <a:fld id="{2A864CAC-480C-453A-B2B7-EA02CF3A7769}" type="slidenum">
+            <a:fld id="{A574171A-7688-4A0F-8841-E08B9AE9B78E}" type="slidenum">
               <a:rPr lang="en-US" smtClean="0"/>
               <a:t>‹#›</a:t>
             </a:fld>
@@ -1471,7 +1471,7 @@
     </p:spTree>
     <p:extLst>
       <p:ext uri="{BB962C8B-B14F-4D97-AF65-F5344CB8AC3E}">
-        <p14:creationId xmlns:p14="http://schemas.microsoft.com/office/powerpoint/2010/main" val="56405578"/>
+        <p14:creationId xmlns:p14="http://schemas.microsoft.com/office/powerpoint/2010/main" val="3115686276"/>
       </p:ext>
     </p:extLst>
   </p:cSld>
@@ -1503,7 +1503,7 @@
           <p:cNvPr id="2" name="Title 1">
             <a:extLst>
               <a:ext uri="{FF2B5EF4-FFF2-40B4-BE49-F238E27FC236}">
-                <a16:creationId xmlns:a16="http://schemas.microsoft.com/office/drawing/2014/main" id="{D824BA7B-0189-E1A2-D4AF-2BCFB68B5059}"/>
+                <a16:creationId xmlns:a16="http://schemas.microsoft.com/office/drawing/2014/main" id="{A992B5D4-BD0F-E739-FA2A-EC2FD2620BC9}"/>
               </a:ext>
             </a:extLst>
           </p:cNvPr>
@@ -1540,7 +1540,7 @@
           <p:cNvPr id="3" name="Text Placeholder 2">
             <a:extLst>
               <a:ext uri="{FF2B5EF4-FFF2-40B4-BE49-F238E27FC236}">
-                <a16:creationId xmlns:a16="http://schemas.microsoft.com/office/drawing/2014/main" id="{18A051D0-A642-090F-D849-BC4A306945FA}"/>
+                <a16:creationId xmlns:a16="http://schemas.microsoft.com/office/drawing/2014/main" id="{CF6486AA-79FC-67CF-6622-6F25000B0064}"/>
               </a:ext>
             </a:extLst>
           </p:cNvPr>
@@ -1665,7 +1665,7 @@
           <p:cNvPr id="4" name="Date Placeholder 3">
             <a:extLst>
               <a:ext uri="{FF2B5EF4-FFF2-40B4-BE49-F238E27FC236}">
-                <a16:creationId xmlns:a16="http://schemas.microsoft.com/office/drawing/2014/main" id="{19F13EAA-9A1D-B481-9D73-3256454C7BD6}"/>
+                <a16:creationId xmlns:a16="http://schemas.microsoft.com/office/drawing/2014/main" id="{4B5A36E8-4FFE-EBC8-E12D-B4616EA9B5C4}"/>
               </a:ext>
             </a:extLst>
           </p:cNvPr>
@@ -1681,9 +1681,9 @@
           <a:bodyPr/>
           <a:lstStyle/>
           <a:p>
-            <a:fld id="{CCDA7376-EEC0-46C7-9DFC-2C36E4C00015}" type="datetimeFigureOut">
+            <a:fld id="{D0427CD7-63F2-45BE-9E95-E93FC6C04848}" type="datetimeFigureOut">
               <a:rPr lang="en-US" smtClean="0"/>
-              <a:t>3/10/2025</a:t>
+              <a:t>3/19/2025</a:t>
             </a:fld>
             <a:endParaRPr lang="en-US"/>
           </a:p>
@@ -1694,7 +1694,7 @@
           <p:cNvPr id="5" name="Footer Placeholder 4">
             <a:extLst>
               <a:ext uri="{FF2B5EF4-FFF2-40B4-BE49-F238E27FC236}">
-                <a16:creationId xmlns:a16="http://schemas.microsoft.com/office/drawing/2014/main" id="{546351FA-B0CD-668F-F78A-4DB38BEDF98C}"/>
+                <a16:creationId xmlns:a16="http://schemas.microsoft.com/office/drawing/2014/main" id="{A294D6F2-E3B3-A5A2-C01B-8C3C8A1D20DE}"/>
               </a:ext>
             </a:extLst>
           </p:cNvPr>
@@ -1719,7 +1719,7 @@
           <p:cNvPr id="6" name="Slide Number Placeholder 5">
             <a:extLst>
               <a:ext uri="{FF2B5EF4-FFF2-40B4-BE49-F238E27FC236}">
-                <a16:creationId xmlns:a16="http://schemas.microsoft.com/office/drawing/2014/main" id="{47F0539F-A997-DB6A-156E-4BEED052FEE0}"/>
+                <a16:creationId xmlns:a16="http://schemas.microsoft.com/office/drawing/2014/main" id="{D9E990DD-48C9-2FFA-D023-BFCD049BAB24}"/>
               </a:ext>
             </a:extLst>
           </p:cNvPr>
@@ -1735,7 +1735,7 @@
           <a:bodyPr/>
           <a:lstStyle/>
           <a:p>
-            <a:fld id="{2A864CAC-480C-453A-B2B7-EA02CF3A7769}" type="slidenum">
+            <a:fld id="{A574171A-7688-4A0F-8841-E08B9AE9B78E}" type="slidenum">
               <a:rPr lang="en-US" smtClean="0"/>
               <a:t>‹#›</a:t>
             </a:fld>
@@ -1746,7 +1746,7 @@
     </p:spTree>
     <p:extLst>
       <p:ext uri="{BB962C8B-B14F-4D97-AF65-F5344CB8AC3E}">
-        <p14:creationId xmlns:p14="http://schemas.microsoft.com/office/powerpoint/2010/main" val="2979085006"/>
+        <p14:creationId xmlns:p14="http://schemas.microsoft.com/office/powerpoint/2010/main" val="161829290"/>
       </p:ext>
     </p:extLst>
   </p:cSld>
@@ -1778,7 +1778,7 @@
           <p:cNvPr id="2" name="Title 1">
             <a:extLst>
               <a:ext uri="{FF2B5EF4-FFF2-40B4-BE49-F238E27FC236}">
-                <a16:creationId xmlns:a16="http://schemas.microsoft.com/office/drawing/2014/main" id="{6076D0D3-0538-0967-6441-5259D862060E}"/>
+                <a16:creationId xmlns:a16="http://schemas.microsoft.com/office/drawing/2014/main" id="{CBA10A48-D3F3-426B-0199-4FC77D48FAB1}"/>
               </a:ext>
             </a:extLst>
           </p:cNvPr>
@@ -1806,7 +1806,7 @@
           <p:cNvPr id="3" name="Content Placeholder 2">
             <a:extLst>
               <a:ext uri="{FF2B5EF4-FFF2-40B4-BE49-F238E27FC236}">
-                <a16:creationId xmlns:a16="http://schemas.microsoft.com/office/drawing/2014/main" id="{D8BACCC1-CA1F-4B79-6D6B-EDE6E11458DE}"/>
+                <a16:creationId xmlns:a16="http://schemas.microsoft.com/office/drawing/2014/main" id="{F515DC11-78EC-9E8D-C8D2-E89B36E9112A}"/>
               </a:ext>
             </a:extLst>
           </p:cNvPr>
@@ -1868,7 +1868,7 @@
           <p:cNvPr id="4" name="Content Placeholder 3">
             <a:extLst>
               <a:ext uri="{FF2B5EF4-FFF2-40B4-BE49-F238E27FC236}">
-                <a16:creationId xmlns:a16="http://schemas.microsoft.com/office/drawing/2014/main" id="{F459E0E3-6F77-3C88-3092-527FDF032799}"/>
+                <a16:creationId xmlns:a16="http://schemas.microsoft.com/office/drawing/2014/main" id="{131EEBC7-EAA1-ED9E-6683-CC04010DD277}"/>
               </a:ext>
             </a:extLst>
           </p:cNvPr>
@@ -1930,7 +1930,7 @@
           <p:cNvPr id="5" name="Date Placeholder 4">
             <a:extLst>
               <a:ext uri="{FF2B5EF4-FFF2-40B4-BE49-F238E27FC236}">
-                <a16:creationId xmlns:a16="http://schemas.microsoft.com/office/drawing/2014/main" id="{B4AD8C84-E378-7C6D-6FD3-D2327CB1BD54}"/>
+                <a16:creationId xmlns:a16="http://schemas.microsoft.com/office/drawing/2014/main" id="{A41696B9-910D-0BF6-1AAE-3DFB03729F73}"/>
               </a:ext>
             </a:extLst>
           </p:cNvPr>
@@ -1946,9 +1946,9 @@
           <a:bodyPr/>
           <a:lstStyle/>
           <a:p>
-            <a:fld id="{CCDA7376-EEC0-46C7-9DFC-2C36E4C00015}" type="datetimeFigureOut">
+            <a:fld id="{D0427CD7-63F2-45BE-9E95-E93FC6C04848}" type="datetimeFigureOut">
               <a:rPr lang="en-US" smtClean="0"/>
-              <a:t>3/10/2025</a:t>
+              <a:t>3/19/2025</a:t>
             </a:fld>
             <a:endParaRPr lang="en-US"/>
           </a:p>
@@ -1959,7 +1959,7 @@
           <p:cNvPr id="6" name="Footer Placeholder 5">
             <a:extLst>
               <a:ext uri="{FF2B5EF4-FFF2-40B4-BE49-F238E27FC236}">
-                <a16:creationId xmlns:a16="http://schemas.microsoft.com/office/drawing/2014/main" id="{972B73D0-F763-B605-837D-D6FC5206E9C2}"/>
+                <a16:creationId xmlns:a16="http://schemas.microsoft.com/office/drawing/2014/main" id="{81BB8CB7-6384-B808-7CFA-7EDA3CB71410}"/>
               </a:ext>
             </a:extLst>
           </p:cNvPr>
@@ -1984,7 +1984,7 @@
           <p:cNvPr id="7" name="Slide Number Placeholder 6">
             <a:extLst>
               <a:ext uri="{FF2B5EF4-FFF2-40B4-BE49-F238E27FC236}">
-                <a16:creationId xmlns:a16="http://schemas.microsoft.com/office/drawing/2014/main" id="{38EE1644-924B-6917-3254-311306268B51}"/>
+                <a16:creationId xmlns:a16="http://schemas.microsoft.com/office/drawing/2014/main" id="{03A159EA-9F52-9405-66D3-41A037DA2A7C}"/>
               </a:ext>
             </a:extLst>
           </p:cNvPr>
@@ -2000,7 +2000,7 @@
           <a:bodyPr/>
           <a:lstStyle/>
           <a:p>
-            <a:fld id="{2A864CAC-480C-453A-B2B7-EA02CF3A7769}" type="slidenum">
+            <a:fld id="{A574171A-7688-4A0F-8841-E08B9AE9B78E}" type="slidenum">
               <a:rPr lang="en-US" smtClean="0"/>
               <a:t>‹#›</a:t>
             </a:fld>
@@ -2011,7 +2011,7 @@
     </p:spTree>
     <p:extLst>
       <p:ext uri="{BB962C8B-B14F-4D97-AF65-F5344CB8AC3E}">
-        <p14:creationId xmlns:p14="http://schemas.microsoft.com/office/powerpoint/2010/main" val="3698269659"/>
+        <p14:creationId xmlns:p14="http://schemas.microsoft.com/office/powerpoint/2010/main" val="188969878"/>
       </p:ext>
     </p:extLst>
   </p:cSld>
@@ -2043,7 +2043,7 @@
           <p:cNvPr id="2" name="Title 1">
             <a:extLst>
               <a:ext uri="{FF2B5EF4-FFF2-40B4-BE49-F238E27FC236}">
-                <a16:creationId xmlns:a16="http://schemas.microsoft.com/office/drawing/2014/main" id="{B77E81D7-FF6D-CE42-7813-A4C2ED2882B2}"/>
+                <a16:creationId xmlns:a16="http://schemas.microsoft.com/office/drawing/2014/main" id="{2A0A42CB-AC1F-986C-517B-CF6B9AC32E11}"/>
               </a:ext>
             </a:extLst>
           </p:cNvPr>
@@ -2076,7 +2076,7 @@
           <p:cNvPr id="3" name="Text Placeholder 2">
             <a:extLst>
               <a:ext uri="{FF2B5EF4-FFF2-40B4-BE49-F238E27FC236}">
-                <a16:creationId xmlns:a16="http://schemas.microsoft.com/office/drawing/2014/main" id="{53BB6513-AA7D-FAA9-296D-86DAFA9DD5A2}"/>
+                <a16:creationId xmlns:a16="http://schemas.microsoft.com/office/drawing/2014/main" id="{B6E65F76-0776-34E3-E770-BC4F507BC4C1}"/>
               </a:ext>
             </a:extLst>
           </p:cNvPr>
@@ -2147,7 +2147,7 @@
           <p:cNvPr id="4" name="Content Placeholder 3">
             <a:extLst>
               <a:ext uri="{FF2B5EF4-FFF2-40B4-BE49-F238E27FC236}">
-                <a16:creationId xmlns:a16="http://schemas.microsoft.com/office/drawing/2014/main" id="{7332A761-7149-8002-1724-E3539B858828}"/>
+                <a16:creationId xmlns:a16="http://schemas.microsoft.com/office/drawing/2014/main" id="{2A82A1EB-9469-2EF8-C99C-CB0D23878BAD}"/>
               </a:ext>
             </a:extLst>
           </p:cNvPr>
@@ -2209,7 +2209,7 @@
           <p:cNvPr id="5" name="Text Placeholder 4">
             <a:extLst>
               <a:ext uri="{FF2B5EF4-FFF2-40B4-BE49-F238E27FC236}">
-                <a16:creationId xmlns:a16="http://schemas.microsoft.com/office/drawing/2014/main" id="{DA716131-2DBC-5655-DCE9-1F16A0CBA2E4}"/>
+                <a16:creationId xmlns:a16="http://schemas.microsoft.com/office/drawing/2014/main" id="{7CE4A1E0-2E36-F156-5235-CDEE31F56196}"/>
               </a:ext>
             </a:extLst>
           </p:cNvPr>
@@ -2280,7 +2280,7 @@
           <p:cNvPr id="6" name="Content Placeholder 5">
             <a:extLst>
               <a:ext uri="{FF2B5EF4-FFF2-40B4-BE49-F238E27FC236}">
-                <a16:creationId xmlns:a16="http://schemas.microsoft.com/office/drawing/2014/main" id="{20E0AD11-7244-BA6B-455D-56A64A0259D1}"/>
+                <a16:creationId xmlns:a16="http://schemas.microsoft.com/office/drawing/2014/main" id="{FAB04E00-9BCC-6025-BF34-776CD327B325}"/>
               </a:ext>
             </a:extLst>
           </p:cNvPr>
@@ -2342,7 +2342,7 @@
           <p:cNvPr id="7" name="Date Placeholder 6">
             <a:extLst>
               <a:ext uri="{FF2B5EF4-FFF2-40B4-BE49-F238E27FC236}">
-                <a16:creationId xmlns:a16="http://schemas.microsoft.com/office/drawing/2014/main" id="{E593E6C7-C00B-E428-554C-14A7B8A952CF}"/>
+                <a16:creationId xmlns:a16="http://schemas.microsoft.com/office/drawing/2014/main" id="{19DED5B6-E920-F8E3-6C22-D373C3381A35}"/>
               </a:ext>
             </a:extLst>
           </p:cNvPr>
@@ -2358,9 +2358,9 @@
           <a:bodyPr/>
           <a:lstStyle/>
           <a:p>
-            <a:fld id="{CCDA7376-EEC0-46C7-9DFC-2C36E4C00015}" type="datetimeFigureOut">
+            <a:fld id="{D0427CD7-63F2-45BE-9E95-E93FC6C04848}" type="datetimeFigureOut">
               <a:rPr lang="en-US" smtClean="0"/>
-              <a:t>3/10/2025</a:t>
+              <a:t>3/19/2025</a:t>
             </a:fld>
             <a:endParaRPr lang="en-US"/>
           </a:p>
@@ -2371,7 +2371,7 @@
           <p:cNvPr id="8" name="Footer Placeholder 7">
             <a:extLst>
               <a:ext uri="{FF2B5EF4-FFF2-40B4-BE49-F238E27FC236}">
-                <a16:creationId xmlns:a16="http://schemas.microsoft.com/office/drawing/2014/main" id="{E35A4C0C-9122-00EE-B002-220787B65990}"/>
+                <a16:creationId xmlns:a16="http://schemas.microsoft.com/office/drawing/2014/main" id="{8BB4AE22-7776-243B-B147-B0B831829CA3}"/>
               </a:ext>
             </a:extLst>
           </p:cNvPr>
@@ -2396,7 +2396,7 @@
           <p:cNvPr id="9" name="Slide Number Placeholder 8">
             <a:extLst>
               <a:ext uri="{FF2B5EF4-FFF2-40B4-BE49-F238E27FC236}">
-                <a16:creationId xmlns:a16="http://schemas.microsoft.com/office/drawing/2014/main" id="{F3B6A0DD-7D00-4C49-38EF-BAD7F400295D}"/>
+                <a16:creationId xmlns:a16="http://schemas.microsoft.com/office/drawing/2014/main" id="{A86BC5D4-AD9A-B11D-98F1-05F2E5B31C88}"/>
               </a:ext>
             </a:extLst>
           </p:cNvPr>
@@ -2412,7 +2412,7 @@
           <a:bodyPr/>
           <a:lstStyle/>
           <a:p>
-            <a:fld id="{2A864CAC-480C-453A-B2B7-EA02CF3A7769}" type="slidenum">
+            <a:fld id="{A574171A-7688-4A0F-8841-E08B9AE9B78E}" type="slidenum">
               <a:rPr lang="en-US" smtClean="0"/>
               <a:t>‹#›</a:t>
             </a:fld>
@@ -2423,7 +2423,7 @@
     </p:spTree>
     <p:extLst>
       <p:ext uri="{BB962C8B-B14F-4D97-AF65-F5344CB8AC3E}">
-        <p14:creationId xmlns:p14="http://schemas.microsoft.com/office/powerpoint/2010/main" val="1819075003"/>
+        <p14:creationId xmlns:p14="http://schemas.microsoft.com/office/powerpoint/2010/main" val="2935290839"/>
       </p:ext>
     </p:extLst>
   </p:cSld>
@@ -2455,7 +2455,7 @@
           <p:cNvPr id="2" name="Title 1">
             <a:extLst>
               <a:ext uri="{FF2B5EF4-FFF2-40B4-BE49-F238E27FC236}">
-                <a16:creationId xmlns:a16="http://schemas.microsoft.com/office/drawing/2014/main" id="{4FD1895F-11D6-23CA-EC59-BE42628F2391}"/>
+                <a16:creationId xmlns:a16="http://schemas.microsoft.com/office/drawing/2014/main" id="{D27C2D79-99CC-B965-7DAF-CC000ED9F1E6}"/>
               </a:ext>
             </a:extLst>
           </p:cNvPr>
@@ -2483,7 +2483,7 @@
           <p:cNvPr id="3" name="Date Placeholder 2">
             <a:extLst>
               <a:ext uri="{FF2B5EF4-FFF2-40B4-BE49-F238E27FC236}">
-                <a16:creationId xmlns:a16="http://schemas.microsoft.com/office/drawing/2014/main" id="{108551C6-5AA6-44AE-D884-9A14D1CB8ADB}"/>
+                <a16:creationId xmlns:a16="http://schemas.microsoft.com/office/drawing/2014/main" id="{11C250EC-9D0E-64D1-6782-5789A5FE0FF0}"/>
               </a:ext>
             </a:extLst>
           </p:cNvPr>
@@ -2499,9 +2499,9 @@
           <a:bodyPr/>
           <a:lstStyle/>
           <a:p>
-            <a:fld id="{CCDA7376-EEC0-46C7-9DFC-2C36E4C00015}" type="datetimeFigureOut">
+            <a:fld id="{D0427CD7-63F2-45BE-9E95-E93FC6C04848}" type="datetimeFigureOut">
               <a:rPr lang="en-US" smtClean="0"/>
-              <a:t>3/10/2025</a:t>
+              <a:t>3/19/2025</a:t>
             </a:fld>
             <a:endParaRPr lang="en-US"/>
           </a:p>
@@ -2512,7 +2512,7 @@
           <p:cNvPr id="4" name="Footer Placeholder 3">
             <a:extLst>
               <a:ext uri="{FF2B5EF4-FFF2-40B4-BE49-F238E27FC236}">
-                <a16:creationId xmlns:a16="http://schemas.microsoft.com/office/drawing/2014/main" id="{13E7D60B-B63B-4C65-C7FE-D709725544E2}"/>
+                <a16:creationId xmlns:a16="http://schemas.microsoft.com/office/drawing/2014/main" id="{C8DF6B44-5922-211E-1396-AEFEA2351FEC}"/>
               </a:ext>
             </a:extLst>
           </p:cNvPr>
@@ -2537,7 +2537,7 @@
           <p:cNvPr id="5" name="Slide Number Placeholder 4">
             <a:extLst>
               <a:ext uri="{FF2B5EF4-FFF2-40B4-BE49-F238E27FC236}">
-                <a16:creationId xmlns:a16="http://schemas.microsoft.com/office/drawing/2014/main" id="{C0C54496-435F-542F-7BA3-61528A4E5E77}"/>
+                <a16:creationId xmlns:a16="http://schemas.microsoft.com/office/drawing/2014/main" id="{A6FBE699-E131-5B19-1CAE-450F67463A0F}"/>
               </a:ext>
             </a:extLst>
           </p:cNvPr>
@@ -2553,7 +2553,7 @@
           <a:bodyPr/>
           <a:lstStyle/>
           <a:p>
-            <a:fld id="{2A864CAC-480C-453A-B2B7-EA02CF3A7769}" type="slidenum">
+            <a:fld id="{A574171A-7688-4A0F-8841-E08B9AE9B78E}" type="slidenum">
               <a:rPr lang="en-US" smtClean="0"/>
               <a:t>‹#›</a:t>
             </a:fld>
@@ -2564,7 +2564,7 @@
     </p:spTree>
     <p:extLst>
       <p:ext uri="{BB962C8B-B14F-4D97-AF65-F5344CB8AC3E}">
-        <p14:creationId xmlns:p14="http://schemas.microsoft.com/office/powerpoint/2010/main" val="1032937821"/>
+        <p14:creationId xmlns:p14="http://schemas.microsoft.com/office/powerpoint/2010/main" val="3837944681"/>
       </p:ext>
     </p:extLst>
   </p:cSld>
@@ -2596,7 +2596,7 @@
           <p:cNvPr id="2" name="Date Placeholder 1">
             <a:extLst>
               <a:ext uri="{FF2B5EF4-FFF2-40B4-BE49-F238E27FC236}">
-                <a16:creationId xmlns:a16="http://schemas.microsoft.com/office/drawing/2014/main" id="{A948F316-3653-F827-C4FF-E9A5520C413E}"/>
+                <a16:creationId xmlns:a16="http://schemas.microsoft.com/office/drawing/2014/main" id="{670E8E03-47EC-B775-442B-B22191744224}"/>
               </a:ext>
             </a:extLst>
           </p:cNvPr>
@@ -2612,9 +2612,9 @@
           <a:bodyPr/>
           <a:lstStyle/>
           <a:p>
-            <a:fld id="{CCDA7376-EEC0-46C7-9DFC-2C36E4C00015}" type="datetimeFigureOut">
+            <a:fld id="{D0427CD7-63F2-45BE-9E95-E93FC6C04848}" type="datetimeFigureOut">
               <a:rPr lang="en-US" smtClean="0"/>
-              <a:t>3/10/2025</a:t>
+              <a:t>3/19/2025</a:t>
             </a:fld>
             <a:endParaRPr lang="en-US"/>
           </a:p>
@@ -2625,7 +2625,7 @@
           <p:cNvPr id="3" name="Footer Placeholder 2">
             <a:extLst>
               <a:ext uri="{FF2B5EF4-FFF2-40B4-BE49-F238E27FC236}">
-                <a16:creationId xmlns:a16="http://schemas.microsoft.com/office/drawing/2014/main" id="{D1DFA9D1-881F-DD73-DA89-49983FC2001A}"/>
+                <a16:creationId xmlns:a16="http://schemas.microsoft.com/office/drawing/2014/main" id="{283A5823-66DC-2D90-FB7A-0A745BE020AD}"/>
               </a:ext>
             </a:extLst>
           </p:cNvPr>
@@ -2650,7 +2650,7 @@
           <p:cNvPr id="4" name="Slide Number Placeholder 3">
             <a:extLst>
               <a:ext uri="{FF2B5EF4-FFF2-40B4-BE49-F238E27FC236}">
-                <a16:creationId xmlns:a16="http://schemas.microsoft.com/office/drawing/2014/main" id="{F2A175E0-91BA-6080-6A31-DDDFB45B07F2}"/>
+                <a16:creationId xmlns:a16="http://schemas.microsoft.com/office/drawing/2014/main" id="{407B1B50-DB22-4FD1-E261-A4840BE5AD5F}"/>
               </a:ext>
             </a:extLst>
           </p:cNvPr>
@@ -2666,7 +2666,7 @@
           <a:bodyPr/>
           <a:lstStyle/>
           <a:p>
-            <a:fld id="{2A864CAC-480C-453A-B2B7-EA02CF3A7769}" type="slidenum">
+            <a:fld id="{A574171A-7688-4A0F-8841-E08B9AE9B78E}" type="slidenum">
               <a:rPr lang="en-US" smtClean="0"/>
               <a:t>‹#›</a:t>
             </a:fld>
@@ -2677,7 +2677,7 @@
     </p:spTree>
     <p:extLst>
       <p:ext uri="{BB962C8B-B14F-4D97-AF65-F5344CB8AC3E}">
-        <p14:creationId xmlns:p14="http://schemas.microsoft.com/office/powerpoint/2010/main" val="2783126235"/>
+        <p14:creationId xmlns:p14="http://schemas.microsoft.com/office/powerpoint/2010/main" val="943060441"/>
       </p:ext>
     </p:extLst>
   </p:cSld>
@@ -2709,7 +2709,7 @@
           <p:cNvPr id="2" name="Title 1">
             <a:extLst>
               <a:ext uri="{FF2B5EF4-FFF2-40B4-BE49-F238E27FC236}">
-                <a16:creationId xmlns:a16="http://schemas.microsoft.com/office/drawing/2014/main" id="{72C496E0-CF3A-CF2F-57CF-E9C2A5A741FB}"/>
+                <a16:creationId xmlns:a16="http://schemas.microsoft.com/office/drawing/2014/main" id="{54FBA8F7-3CBA-F36B-00E6-B87C9F11BEED}"/>
               </a:ext>
             </a:extLst>
           </p:cNvPr>
@@ -2746,7 +2746,7 @@
           <p:cNvPr id="3" name="Content Placeholder 2">
             <a:extLst>
               <a:ext uri="{FF2B5EF4-FFF2-40B4-BE49-F238E27FC236}">
-                <a16:creationId xmlns:a16="http://schemas.microsoft.com/office/drawing/2014/main" id="{D73396AE-D59F-7BFB-FBDC-86B366B4417C}"/>
+                <a16:creationId xmlns:a16="http://schemas.microsoft.com/office/drawing/2014/main" id="{55F77097-4984-1883-B305-44903E1BCC32}"/>
               </a:ext>
             </a:extLst>
           </p:cNvPr>
@@ -2836,7 +2836,7 @@
           <p:cNvPr id="4" name="Text Placeholder 3">
             <a:extLst>
               <a:ext uri="{FF2B5EF4-FFF2-40B4-BE49-F238E27FC236}">
-                <a16:creationId xmlns:a16="http://schemas.microsoft.com/office/drawing/2014/main" id="{B6877602-89BE-F659-06A8-DD106EFA3775}"/>
+                <a16:creationId xmlns:a16="http://schemas.microsoft.com/office/drawing/2014/main" id="{CBBCE487-23AF-B241-D760-153B1A94A89C}"/>
               </a:ext>
             </a:extLst>
           </p:cNvPr>
@@ -2907,7 +2907,7 @@
           <p:cNvPr id="5" name="Date Placeholder 4">
             <a:extLst>
               <a:ext uri="{FF2B5EF4-FFF2-40B4-BE49-F238E27FC236}">
-                <a16:creationId xmlns:a16="http://schemas.microsoft.com/office/drawing/2014/main" id="{02625C99-57DF-E6E4-D238-3A49B64F76DB}"/>
+                <a16:creationId xmlns:a16="http://schemas.microsoft.com/office/drawing/2014/main" id="{EA214E01-4A72-0D95-6926-31317CDC011A}"/>
               </a:ext>
             </a:extLst>
           </p:cNvPr>
@@ -2923,9 +2923,9 @@
           <a:bodyPr/>
           <a:lstStyle/>
           <a:p>
-            <a:fld id="{CCDA7376-EEC0-46C7-9DFC-2C36E4C00015}" type="datetimeFigureOut">
+            <a:fld id="{D0427CD7-63F2-45BE-9E95-E93FC6C04848}" type="datetimeFigureOut">
               <a:rPr lang="en-US" smtClean="0"/>
-              <a:t>3/10/2025</a:t>
+              <a:t>3/19/2025</a:t>
             </a:fld>
             <a:endParaRPr lang="en-US"/>
           </a:p>
@@ -2936,7 +2936,7 @@
           <p:cNvPr id="6" name="Footer Placeholder 5">
             <a:extLst>
               <a:ext uri="{FF2B5EF4-FFF2-40B4-BE49-F238E27FC236}">
-                <a16:creationId xmlns:a16="http://schemas.microsoft.com/office/drawing/2014/main" id="{8D9AE839-0E90-A163-18A2-4457CD1229A8}"/>
+                <a16:creationId xmlns:a16="http://schemas.microsoft.com/office/drawing/2014/main" id="{5199D0B2-810E-481E-47ED-899A6A059EA7}"/>
               </a:ext>
             </a:extLst>
           </p:cNvPr>
@@ -2961,7 +2961,7 @@
           <p:cNvPr id="7" name="Slide Number Placeholder 6">
             <a:extLst>
               <a:ext uri="{FF2B5EF4-FFF2-40B4-BE49-F238E27FC236}">
-                <a16:creationId xmlns:a16="http://schemas.microsoft.com/office/drawing/2014/main" id="{AF50BD66-A033-3E55-17F2-F2937EEA5F66}"/>
+                <a16:creationId xmlns:a16="http://schemas.microsoft.com/office/drawing/2014/main" id="{8825ABA3-B088-F68B-9F4F-9A81EF106515}"/>
               </a:ext>
             </a:extLst>
           </p:cNvPr>
@@ -2977,7 +2977,7 @@
           <a:bodyPr/>
           <a:lstStyle/>
           <a:p>
-            <a:fld id="{2A864CAC-480C-453A-B2B7-EA02CF3A7769}" type="slidenum">
+            <a:fld id="{A574171A-7688-4A0F-8841-E08B9AE9B78E}" type="slidenum">
               <a:rPr lang="en-US" smtClean="0"/>
               <a:t>‹#›</a:t>
             </a:fld>
@@ -2988,7 +2988,7 @@
     </p:spTree>
     <p:extLst>
       <p:ext uri="{BB962C8B-B14F-4D97-AF65-F5344CB8AC3E}">
-        <p14:creationId xmlns:p14="http://schemas.microsoft.com/office/powerpoint/2010/main" val="2764090470"/>
+        <p14:creationId xmlns:p14="http://schemas.microsoft.com/office/powerpoint/2010/main" val="1943573613"/>
       </p:ext>
     </p:extLst>
   </p:cSld>
@@ -3020,7 +3020,7 @@
           <p:cNvPr id="2" name="Title 1">
             <a:extLst>
               <a:ext uri="{FF2B5EF4-FFF2-40B4-BE49-F238E27FC236}">
-                <a16:creationId xmlns:a16="http://schemas.microsoft.com/office/drawing/2014/main" id="{CBE30CD4-BB2C-DE63-2FC9-61A4E7FBCFC6}"/>
+                <a16:creationId xmlns:a16="http://schemas.microsoft.com/office/drawing/2014/main" id="{19222926-8FA7-8EA1-5557-215AD7885BF6}"/>
               </a:ext>
             </a:extLst>
           </p:cNvPr>
@@ -3057,7 +3057,7 @@
           <p:cNvPr id="3" name="Picture Placeholder 2">
             <a:extLst>
               <a:ext uri="{FF2B5EF4-FFF2-40B4-BE49-F238E27FC236}">
-                <a16:creationId xmlns:a16="http://schemas.microsoft.com/office/drawing/2014/main" id="{67788D77-114D-71E3-6060-E6C51CB8757D}"/>
+                <a16:creationId xmlns:a16="http://schemas.microsoft.com/office/drawing/2014/main" id="{8B3EAC56-1808-BDCB-D817-FBCDE3F14B4F}"/>
               </a:ext>
             </a:extLst>
           </p:cNvPr>
@@ -3124,7 +3124,7 @@
           <p:cNvPr id="4" name="Text Placeholder 3">
             <a:extLst>
               <a:ext uri="{FF2B5EF4-FFF2-40B4-BE49-F238E27FC236}">
-                <a16:creationId xmlns:a16="http://schemas.microsoft.com/office/drawing/2014/main" id="{9320ABCF-5258-0581-788B-060D0628C0EE}"/>
+                <a16:creationId xmlns:a16="http://schemas.microsoft.com/office/drawing/2014/main" id="{260CD178-5784-B649-E37C-ADF28821BFF5}"/>
               </a:ext>
             </a:extLst>
           </p:cNvPr>
@@ -3195,7 +3195,7 @@
           <p:cNvPr id="5" name="Date Placeholder 4">
             <a:extLst>
               <a:ext uri="{FF2B5EF4-FFF2-40B4-BE49-F238E27FC236}">
-                <a16:creationId xmlns:a16="http://schemas.microsoft.com/office/drawing/2014/main" id="{9C7E506C-1CEA-27FF-2AD2-B979ECCFEC97}"/>
+                <a16:creationId xmlns:a16="http://schemas.microsoft.com/office/drawing/2014/main" id="{94B6B2E2-A825-5632-1790-132288811FB0}"/>
               </a:ext>
             </a:extLst>
           </p:cNvPr>
@@ -3211,9 +3211,9 @@
           <a:bodyPr/>
           <a:lstStyle/>
           <a:p>
-            <a:fld id="{CCDA7376-EEC0-46C7-9DFC-2C36E4C00015}" type="datetimeFigureOut">
+            <a:fld id="{D0427CD7-63F2-45BE-9E95-E93FC6C04848}" type="datetimeFigureOut">
               <a:rPr lang="en-US" smtClean="0"/>
-              <a:t>3/10/2025</a:t>
+              <a:t>3/19/2025</a:t>
             </a:fld>
             <a:endParaRPr lang="en-US"/>
           </a:p>
@@ -3224,7 +3224,7 @@
           <p:cNvPr id="6" name="Footer Placeholder 5">
             <a:extLst>
               <a:ext uri="{FF2B5EF4-FFF2-40B4-BE49-F238E27FC236}">
-                <a16:creationId xmlns:a16="http://schemas.microsoft.com/office/drawing/2014/main" id="{9B494984-FCAB-9891-2352-0BFD78E62594}"/>
+                <a16:creationId xmlns:a16="http://schemas.microsoft.com/office/drawing/2014/main" id="{47B3CB5C-0A27-2FEB-8A40-256A4E4CCF1B}"/>
               </a:ext>
             </a:extLst>
           </p:cNvPr>
@@ -3249,7 +3249,7 @@
           <p:cNvPr id="7" name="Slide Number Placeholder 6">
             <a:extLst>
               <a:ext uri="{FF2B5EF4-FFF2-40B4-BE49-F238E27FC236}">
-                <a16:creationId xmlns:a16="http://schemas.microsoft.com/office/drawing/2014/main" id="{AD4D1C9B-6E7A-D378-C019-903AE945B77C}"/>
+                <a16:creationId xmlns:a16="http://schemas.microsoft.com/office/drawing/2014/main" id="{136886EF-C491-0CD9-FD8F-BDC90472B777}"/>
               </a:ext>
             </a:extLst>
           </p:cNvPr>
@@ -3265,7 +3265,7 @@
           <a:bodyPr/>
           <a:lstStyle/>
           <a:p>
-            <a:fld id="{2A864CAC-480C-453A-B2B7-EA02CF3A7769}" type="slidenum">
+            <a:fld id="{A574171A-7688-4A0F-8841-E08B9AE9B78E}" type="slidenum">
               <a:rPr lang="en-US" smtClean="0"/>
               <a:t>‹#›</a:t>
             </a:fld>
@@ -3276,7 +3276,7 @@
     </p:spTree>
     <p:extLst>
       <p:ext uri="{BB962C8B-B14F-4D97-AF65-F5344CB8AC3E}">
-        <p14:creationId xmlns:p14="http://schemas.microsoft.com/office/powerpoint/2010/main" val="921706475"/>
+        <p14:creationId xmlns:p14="http://schemas.microsoft.com/office/powerpoint/2010/main" val="770149194"/>
       </p:ext>
     </p:extLst>
   </p:cSld>
@@ -3313,7 +3313,7 @@
           <p:cNvPr id="2" name="Title Placeholder 1">
             <a:extLst>
               <a:ext uri="{FF2B5EF4-FFF2-40B4-BE49-F238E27FC236}">
-                <a16:creationId xmlns:a16="http://schemas.microsoft.com/office/drawing/2014/main" id="{7F808801-5A35-5389-3C16-EA7EBC3D070E}"/>
+                <a16:creationId xmlns:a16="http://schemas.microsoft.com/office/drawing/2014/main" id="{0CD84744-3801-E4C1-9E93-6131B1F4A898}"/>
               </a:ext>
             </a:extLst>
           </p:cNvPr>
@@ -3351,7 +3351,7 @@
           <p:cNvPr id="3" name="Text Placeholder 2">
             <a:extLst>
               <a:ext uri="{FF2B5EF4-FFF2-40B4-BE49-F238E27FC236}">
-                <a16:creationId xmlns:a16="http://schemas.microsoft.com/office/drawing/2014/main" id="{3801E304-FC48-630E-929E-418FD130D9DC}"/>
+                <a16:creationId xmlns:a16="http://schemas.microsoft.com/office/drawing/2014/main" id="{BB9293A8-BC29-38B2-879B-9E6787547449}"/>
               </a:ext>
             </a:extLst>
           </p:cNvPr>
@@ -3418,7 +3418,7 @@
           <p:cNvPr id="4" name="Date Placeholder 3">
             <a:extLst>
               <a:ext uri="{FF2B5EF4-FFF2-40B4-BE49-F238E27FC236}">
-                <a16:creationId xmlns:a16="http://schemas.microsoft.com/office/drawing/2014/main" id="{A89C6C5A-3965-C7CA-7E3E-BCB0FF9C7B1E}"/>
+                <a16:creationId xmlns:a16="http://schemas.microsoft.com/office/drawing/2014/main" id="{8AB396A9-19E4-BF16-2300-30BE99CC323F}"/>
               </a:ext>
             </a:extLst>
           </p:cNvPr>
@@ -3452,9 +3452,9 @@
             </a:lvl1pPr>
           </a:lstStyle>
           <a:p>
-            <a:fld id="{CCDA7376-EEC0-46C7-9DFC-2C36E4C00015}" type="datetimeFigureOut">
+            <a:fld id="{D0427CD7-63F2-45BE-9E95-E93FC6C04848}" type="datetimeFigureOut">
               <a:rPr lang="en-US" smtClean="0"/>
-              <a:t>3/10/2025</a:t>
+              <a:t>3/19/2025</a:t>
             </a:fld>
             <a:endParaRPr lang="en-US"/>
           </a:p>
@@ -3465,7 +3465,7 @@
           <p:cNvPr id="5" name="Footer Placeholder 4">
             <a:extLst>
               <a:ext uri="{FF2B5EF4-FFF2-40B4-BE49-F238E27FC236}">
-                <a16:creationId xmlns:a16="http://schemas.microsoft.com/office/drawing/2014/main" id="{B9FAE467-5A0E-0B2B-973D-49D3DB2B1B5A}"/>
+                <a16:creationId xmlns:a16="http://schemas.microsoft.com/office/drawing/2014/main" id="{E5357594-4F82-77D1-6F01-8408682D888E}"/>
               </a:ext>
             </a:extLst>
           </p:cNvPr>
@@ -3508,7 +3508,7 @@
           <p:cNvPr id="6" name="Slide Number Placeholder 5">
             <a:extLst>
               <a:ext uri="{FF2B5EF4-FFF2-40B4-BE49-F238E27FC236}">
-                <a16:creationId xmlns:a16="http://schemas.microsoft.com/office/drawing/2014/main" id="{9D6954C3-63C3-A54A-ABEE-6B6BDC8C5E0E}"/>
+                <a16:creationId xmlns:a16="http://schemas.microsoft.com/office/drawing/2014/main" id="{BF712FAB-687F-19F2-6F28-FD0CC9324097}"/>
               </a:ext>
             </a:extLst>
           </p:cNvPr>
@@ -3542,7 +3542,7 @@
             </a:lvl1pPr>
           </a:lstStyle>
           <a:p>
-            <a:fld id="{2A864CAC-480C-453A-B2B7-EA02CF3A7769}" type="slidenum">
+            <a:fld id="{A574171A-7688-4A0F-8841-E08B9AE9B78E}" type="slidenum">
               <a:rPr lang="en-US" smtClean="0"/>
               <a:t>‹#›</a:t>
             </a:fld>
@@ -3553,7 +3553,7 @@
     </p:spTree>
     <p:extLst>
       <p:ext uri="{BB962C8B-B14F-4D97-AF65-F5344CB8AC3E}">
-        <p14:creationId xmlns:p14="http://schemas.microsoft.com/office/powerpoint/2010/main" val="3143056613"/>
+        <p14:creationId xmlns:p14="http://schemas.microsoft.com/office/powerpoint/2010/main" val="3308032969"/>
       </p:ext>
     </p:extLst>
   </p:cSld>
@@ -5530,326 +5530,4 @@
     </a:ext>
   </a:extLst>
 </a:theme>
-</file>
-
-<file path=customXml/item1.xml><?xml version="1.0" encoding="utf-8"?>
-<?mso-contentType ?>
-<FormTemplates xmlns="http://schemas.microsoft.com/sharepoint/v3/contenttype/forms">
-  <Display>DocumentLibraryForm</Display>
-  <Edit>DocumentLibraryForm</Edit>
-  <New>DocumentLibraryForm</New>
-</FormTemplates>
-</file>
-
-<file path=customXml/item2.xml><?xml version="1.0" encoding="utf-8"?>
-<p:properties xmlns:p="http://schemas.microsoft.com/office/2006/metadata/properties" xmlns:xsi="http://www.w3.org/2001/XMLSchema-instance" xmlns:pc="http://schemas.microsoft.com/office/infopath/2007/PartnerControls">
-  <documentManagement>
-    <_ip_UnifiedCompliancePolicyUIAction xmlns="http://schemas.microsoft.com/sharepoint/v3" xsi:nil="true"/>
-    <_ip_UnifiedCompliancePolicyProperties xmlns="http://schemas.microsoft.com/sharepoint/v3" xsi:nil="true"/>
-    <lcf76f155ced4ddcb4097134ff3c332f xmlns="7bfe81a0-25b1-4a1a-809f-421988818cd4">
-      <Terms xmlns="http://schemas.microsoft.com/office/infopath/2007/PartnerControls"/>
-    </lcf76f155ced4ddcb4097134ff3c332f>
-    <TaxCatchAll xmlns="67d6ef92-78a9-460c-8610-2f58ea409e40" xsi:nil="true"/>
-  </documentManagement>
-</p:properties>
-</file>
-
-<file path=customXml/item3.xml><?xml version="1.0" encoding="utf-8"?>
-<ct:contentTypeSchema xmlns:ct="http://schemas.microsoft.com/office/2006/metadata/contentType" xmlns:ma="http://schemas.microsoft.com/office/2006/metadata/properties/metaAttributes" ct:_="" ma:_="" ma:contentTypeName="Document" ma:contentTypeID="0x010100435D50637B35594E9494AE77306C5A11" ma:contentTypeVersion="17" ma:contentTypeDescription="Create a new document." ma:contentTypeScope="" ma:versionID="fe5faf655b8979a468c758a607e788fb">
-  <xsd:schema xmlns:xsd="http://www.w3.org/2001/XMLSchema" xmlns:xs="http://www.w3.org/2001/XMLSchema" xmlns:p="http://schemas.microsoft.com/office/2006/metadata/properties" xmlns:ns1="http://schemas.microsoft.com/sharepoint/v3" xmlns:ns2="7bfe81a0-25b1-4a1a-809f-421988818cd4" xmlns:ns3="67d6ef92-78a9-460c-8610-2f58ea409e40" targetNamespace="http://schemas.microsoft.com/office/2006/metadata/properties" ma:root="true" ma:fieldsID="896a26a107ded4dd747d36263fcfbbfb" ns1:_="" ns2:_="" ns3:_="">
-    <xsd:import namespace="http://schemas.microsoft.com/sharepoint/v3"/>
-    <xsd:import namespace="7bfe81a0-25b1-4a1a-809f-421988818cd4"/>
-    <xsd:import namespace="67d6ef92-78a9-460c-8610-2f58ea409e40"/>
-    <xsd:element name="properties">
-      <xsd:complexType>
-        <xsd:sequence>
-          <xsd:element name="documentManagement">
-            <xsd:complexType>
-              <xsd:all>
-                <xsd:element ref="ns2:MediaServiceMetadata" minOccurs="0"/>
-                <xsd:element ref="ns2:MediaServiceFastMetadata" minOccurs="0"/>
-                <xsd:element ref="ns2:MediaServiceSearchProperties" minOccurs="0"/>
-                <xsd:element ref="ns2:MediaServiceDateTaken" minOccurs="0"/>
-                <xsd:element ref="ns2:MediaLengthInSeconds" minOccurs="0"/>
-                <xsd:element ref="ns2:MediaServiceDocTags" minOccurs="0"/>
-                <xsd:element ref="ns1:_ip_UnifiedCompliancePolicyProperties" minOccurs="0"/>
-                <xsd:element ref="ns1:_ip_UnifiedCompliancePolicyUIAction" minOccurs="0"/>
-                <xsd:element ref="ns3:SharedWithUsers" minOccurs="0"/>
-                <xsd:element ref="ns3:SharedWithDetails" minOccurs="0"/>
-                <xsd:element ref="ns2:lcf76f155ced4ddcb4097134ff3c332f" minOccurs="0"/>
-                <xsd:element ref="ns3:TaxCatchAll" minOccurs="0"/>
-                <xsd:element ref="ns2:MediaServiceOCR" minOccurs="0"/>
-                <xsd:element ref="ns2:MediaServiceGenerationTime" minOccurs="0"/>
-                <xsd:element ref="ns2:MediaServiceEventHashCode" minOccurs="0"/>
-                <xsd:element ref="ns2:MediaServiceObjectDetectorVersions" minOccurs="0"/>
-              </xsd:all>
-            </xsd:complexType>
-          </xsd:element>
-        </xsd:sequence>
-      </xsd:complexType>
-    </xsd:element>
-  </xsd:schema>
-  <xsd:schema xmlns:xsd="http://www.w3.org/2001/XMLSchema" xmlns:xs="http://www.w3.org/2001/XMLSchema" xmlns:dms="http://schemas.microsoft.com/office/2006/documentManagement/types" xmlns:pc="http://schemas.microsoft.com/office/infopath/2007/PartnerControls" targetNamespace="http://schemas.microsoft.com/sharepoint/v3" elementFormDefault="qualified">
-    <xsd:import namespace="http://schemas.microsoft.com/office/2006/documentManagement/types"/>
-    <xsd:import namespace="http://schemas.microsoft.com/office/infopath/2007/PartnerControls"/>
-    <xsd:element name="_ip_UnifiedCompliancePolicyProperties" ma:index="14" nillable="true" ma:displayName="Unified Compliance Policy Properties" ma:hidden="true" ma:internalName="_ip_UnifiedCompliancePolicyProperties">
-      <xsd:simpleType>
-        <xsd:restriction base="dms:Note"/>
-      </xsd:simpleType>
-    </xsd:element>
-    <xsd:element name="_ip_UnifiedCompliancePolicyUIAction" ma:index="15" nillable="true" ma:displayName="Unified Compliance Policy UI Action" ma:hidden="true" ma:internalName="_ip_UnifiedCompliancePolicyUIAction">
-      <xsd:simpleType>
-        <xsd:restriction base="dms:Text"/>
-      </xsd:simpleType>
-    </xsd:element>
-  </xsd:schema>
-  <xsd:schema xmlns:xsd="http://www.w3.org/2001/XMLSchema" xmlns:xs="http://www.w3.org/2001/XMLSchema" xmlns:dms="http://schemas.microsoft.com/office/2006/documentManagement/types" xmlns:pc="http://schemas.microsoft.com/office/infopath/2007/PartnerControls" targetNamespace="7bfe81a0-25b1-4a1a-809f-421988818cd4" elementFormDefault="qualified">
-    <xsd:import namespace="http://schemas.microsoft.com/office/2006/documentManagement/types"/>
-    <xsd:import namespace="http://schemas.microsoft.com/office/infopath/2007/PartnerControls"/>
-    <xsd:element name="MediaServiceMetadata" ma:index="8" nillable="true" ma:displayName="MediaServiceMetadata" ma:hidden="true" ma:internalName="MediaServiceMetadata" ma:readOnly="true">
-      <xsd:simpleType>
-        <xsd:restriction base="dms:Note"/>
-      </xsd:simpleType>
-    </xsd:element>
-    <xsd:element name="MediaServiceFastMetadata" ma:index="9" nillable="true" ma:displayName="MediaServiceFastMetadata" ma:hidden="true" ma:internalName="MediaServiceFastMetadata" ma:readOnly="true">
-      <xsd:simpleType>
-        <xsd:restriction base="dms:Note"/>
-      </xsd:simpleType>
-    </xsd:element>
-    <xsd:element name="MediaServiceSearchProperties" ma:index="10" nillable="true" ma:displayName="MediaServiceSearchProperties" ma:hidden="true" ma:internalName="MediaServiceSearchProperties" ma:readOnly="true">
-      <xsd:simpleType>
-        <xsd:restriction base="dms:Note"/>
-      </xsd:simpleType>
-    </xsd:element>
-    <xsd:element name="MediaServiceDateTaken" ma:index="11" nillable="true" ma:displayName="MediaServiceDateTaken" ma:hidden="true" ma:indexed="true" ma:internalName="MediaServiceDateTaken" ma:readOnly="true">
-      <xsd:simpleType>
-        <xsd:restriction base="dms:Text"/>
-      </xsd:simpleType>
-    </xsd:element>
-    <xsd:element name="MediaLengthInSeconds" ma:index="12" nillable="true" ma:displayName="MediaLengthInSeconds" ma:hidden="true" ma:internalName="MediaLengthInSeconds" ma:readOnly="true">
-      <xsd:simpleType>
-        <xsd:restriction base="dms:Unknown"/>
-      </xsd:simpleType>
-    </xsd:element>
-    <xsd:element name="MediaServiceDocTags" ma:index="13" nillable="true" ma:displayName="MediaServiceDocTags" ma:hidden="true" ma:internalName="MediaServiceDocTags" ma:readOnly="true">
-      <xsd:simpleType>
-        <xsd:restriction base="dms:Note"/>
-      </xsd:simpleType>
-    </xsd:element>
-    <xsd:element name="lcf76f155ced4ddcb4097134ff3c332f" ma:index="19" nillable="true" ma:taxonomy="true" ma:internalName="lcf76f155ced4ddcb4097134ff3c332f" ma:taxonomyFieldName="MediaServiceImageTags" ma:displayName="Image Tags" ma:readOnly="false" ma:fieldId="{5cf76f15-5ced-4ddc-b409-7134ff3c332f}" ma:taxonomyMulti="true" ma:sspId="e385fb40-52d4-4fae-9c5b-3e8ff8a5878e" ma:termSetId="09814cd3-568e-fe90-9814-8d621ff8fb84" ma:anchorId="fba54fb3-c3e1-fe81-a776-ca4b69148c4d" ma:open="true" ma:isKeyword="false">
-      <xsd:complexType>
-        <xsd:sequence>
-          <xsd:element ref="pc:Terms" minOccurs="0" maxOccurs="1"/>
-        </xsd:sequence>
-      </xsd:complexType>
-    </xsd:element>
-    <xsd:element name="MediaServiceOCR" ma:index="21" nillable="true" ma:displayName="Extracted Text" ma:internalName="MediaServiceOCR" ma:readOnly="true">
-      <xsd:simpleType>
-        <xsd:restriction base="dms:Note">
-          <xsd:maxLength value="255"/>
-        </xsd:restriction>
-      </xsd:simpleType>
-    </xsd:element>
-    <xsd:element name="MediaServiceGenerationTime" ma:index="22" nillable="true" ma:displayName="MediaServiceGenerationTime" ma:hidden="true" ma:internalName="MediaServiceGenerationTime" ma:readOnly="true">
-      <xsd:simpleType>
-        <xsd:restriction base="dms:Text"/>
-      </xsd:simpleType>
-    </xsd:element>
-    <xsd:element name="MediaServiceEventHashCode" ma:index="23" nillable="true" ma:displayName="MediaServiceEventHashCode" ma:hidden="true" ma:internalName="MediaServiceEventHashCode" ma:readOnly="true">
-      <xsd:simpleType>
-        <xsd:restriction base="dms:Text"/>
-      </xsd:simpleType>
-    </xsd:element>
-    <xsd:element name="MediaServiceObjectDetectorVersions" ma:index="24" nillable="true" ma:displayName="MediaServiceObjectDetectorVersions" ma:hidden="true" ma:indexed="true" ma:internalName="MediaServiceObjectDetectorVersions" ma:readOnly="true">
-      <xsd:simpleType>
-        <xsd:restriction base="dms:Text"/>
-      </xsd:simpleType>
-    </xsd:element>
-  </xsd:schema>
-  <xsd:schema xmlns:xsd="http://www.w3.org/2001/XMLSchema" xmlns:xs="http://www.w3.org/2001/XMLSchema" xmlns:dms="http://schemas.microsoft.com/office/2006/documentManagement/types" xmlns:pc="http://schemas.microsoft.com/office/infopath/2007/PartnerControls" targetNamespace="67d6ef92-78a9-460c-8610-2f58ea409e40" elementFormDefault="qualified">
-    <xsd:import namespace="http://schemas.microsoft.com/office/2006/documentManagement/types"/>
-    <xsd:import namespace="http://schemas.microsoft.com/office/infopath/2007/PartnerControls"/>
-    <xsd:element name="SharedWithUsers" ma:index="16" nillable="true" ma:displayName="Shared With" ma:internalName="SharedWithUsers" ma:readOnly="true">
-      <xsd:complexType>
-        <xsd:complexContent>
-          <xsd:extension base="dms:UserMulti">
-            <xsd:sequence>
-              <xsd:element name="UserInfo" minOccurs="0" maxOccurs="unbounded">
-                <xsd:complexType>
-                  <xsd:sequence>
-                    <xsd:element name="DisplayName" type="xsd:string" minOccurs="0"/>
-                    <xsd:element name="AccountId" type="dms:UserId" minOccurs="0" nillable="true"/>
-                    <xsd:element name="AccountType" type="xsd:string" minOccurs="0"/>
-                  </xsd:sequence>
-                </xsd:complexType>
-              </xsd:element>
-            </xsd:sequence>
-          </xsd:extension>
-        </xsd:complexContent>
-      </xsd:complexType>
-    </xsd:element>
-    <xsd:element name="SharedWithDetails" ma:index="17" nillable="true" ma:displayName="Shared With Details" ma:internalName="SharedWithDetails" ma:readOnly="true">
-      <xsd:simpleType>
-        <xsd:restriction base="dms:Note">
-          <xsd:maxLength value="255"/>
-        </xsd:restriction>
-      </xsd:simpleType>
-    </xsd:element>
-    <xsd:element name="TaxCatchAll" ma:index="20" nillable="true" ma:displayName="Taxonomy Catch All Column" ma:hidden="true" ma:list="{0d6b2f72-c786-40f2-acff-6c7b04b6571d}" ma:internalName="TaxCatchAll" ma:showField="CatchAllData" ma:web="67d6ef92-78a9-460c-8610-2f58ea409e40">
-      <xsd:complexType>
-        <xsd:complexContent>
-          <xsd:extension base="dms:MultiChoiceLookup">
-            <xsd:sequence>
-              <xsd:element name="Value" type="dms:Lookup" maxOccurs="unbounded" minOccurs="0" nillable="true"/>
-            </xsd:sequence>
-          </xsd:extension>
-        </xsd:complexContent>
-      </xsd:complexType>
-    </xsd:element>
-  </xsd:schema>
-  <xsd:schema xmlns="http://schemas.openxmlformats.org/package/2006/metadata/core-properties" xmlns:xsd="http://www.w3.org/2001/XMLSchema" xmlns:xsi="http://www.w3.org/2001/XMLSchema-instance" xmlns:dc="http://purl.org/dc/elements/1.1/" xmlns:dcterms="http://purl.org/dc/terms/" xmlns:odoc="http://schemas.microsoft.com/internal/obd" targetNamespace="http://schemas.openxmlformats.org/package/2006/metadata/core-properties" elementFormDefault="qualified" attributeFormDefault="unqualified" blockDefault="#all">
-    <xsd:import namespace="http://purl.org/dc/elements/1.1/" schemaLocation="http://dublincore.org/schemas/xmls/qdc/2003/04/02/dc.xsd"/>
-    <xsd:import namespace="http://purl.org/dc/terms/" schemaLocation="http://dublincore.org/schemas/xmls/qdc/2003/04/02/dcterms.xsd"/>
-    <xsd:element name="coreProperties" type="CT_coreProperties"/>
-    <xsd:complexType name="CT_coreProperties">
-      <xsd:all>
-        <xsd:element ref="dc:creator" minOccurs="0" maxOccurs="1"/>
-        <xsd:element ref="dcterms:created" minOccurs="0" maxOccurs="1"/>
-        <xsd:element ref="dc:identifier" minOccurs="0" maxOccurs="1"/>
-        <xsd:element name="contentType" minOccurs="0" maxOccurs="1" type="xsd:string" ma:index="0" ma:displayName="Content Type"/>
-        <xsd:element ref="dc:title" minOccurs="0" maxOccurs="1" ma:index="4" ma:displayName="Title"/>
-        <xsd:element ref="dc:subject" minOccurs="0" maxOccurs="1"/>
-        <xsd:element ref="dc:description" minOccurs="0" maxOccurs="1"/>
-        <xsd:element name="keywords" minOccurs="0" maxOccurs="1" type="xsd:string"/>
-        <xsd:element ref="dc:language" minOccurs="0" maxOccurs="1"/>
-        <xsd:element name="category" minOccurs="0" maxOccurs="1" type="xsd:string"/>
-        <xsd:element name="version" minOccurs="0" maxOccurs="1" type="xsd:string"/>
-        <xsd:element name="revision" minOccurs="0" maxOccurs="1" type="xsd:string">
-          <xsd:annotation>
-            <xsd:documentation>
-                        This value indicates the number of saves or revisions. The application is responsible for updating this value after each revision.
-                    </xsd:documentation>
-          </xsd:annotation>
-        </xsd:element>
-        <xsd:element name="lastModifiedBy" minOccurs="0" maxOccurs="1" type="xsd:string"/>
-        <xsd:element ref="dcterms:modified" minOccurs="0" maxOccurs="1"/>
-        <xsd:element name="contentStatus" minOccurs="0" maxOccurs="1" type="xsd:string"/>
-      </xsd:all>
-    </xsd:complexType>
-  </xsd:schema>
-  <xs:schema xmlns:pc="http://schemas.microsoft.com/office/infopath/2007/PartnerControls" xmlns:xs="http://www.w3.org/2001/XMLSchema" targetNamespace="http://schemas.microsoft.com/office/infopath/2007/PartnerControls" elementFormDefault="qualified" attributeFormDefault="unqualified">
-    <xs:element name="Person">
-      <xs:complexType>
-        <xs:sequence>
-          <xs:element ref="pc:DisplayName" minOccurs="0"/>
-          <xs:element ref="pc:AccountId" minOccurs="0"/>
-          <xs:element ref="pc:AccountType" minOccurs="0"/>
-        </xs:sequence>
-      </xs:complexType>
-    </xs:element>
-    <xs:element name="DisplayName" type="xs:string"/>
-    <xs:element name="AccountId" type="xs:string"/>
-    <xs:element name="AccountType" type="xs:string"/>
-    <xs:element name="BDCAssociatedEntity">
-      <xs:complexType>
-        <xs:sequence>
-          <xs:element ref="pc:BDCEntity" minOccurs="0" maxOccurs="unbounded"/>
-        </xs:sequence>
-        <xs:attribute ref="pc:EntityNamespace"/>
-        <xs:attribute ref="pc:EntityName"/>
-        <xs:attribute ref="pc:SystemInstanceName"/>
-        <xs:attribute ref="pc:AssociationName"/>
-      </xs:complexType>
-    </xs:element>
-    <xs:attribute name="EntityNamespace" type="xs:string"/>
-    <xs:attribute name="EntityName" type="xs:string"/>
-    <xs:attribute name="SystemInstanceName" type="xs:string"/>
-    <xs:attribute name="AssociationName" type="xs:string"/>
-    <xs:element name="BDCEntity">
-      <xs:complexType>
-        <xs:sequence>
-          <xs:element ref="pc:EntityDisplayName" minOccurs="0"/>
-          <xs:element ref="pc:EntityInstanceReference" minOccurs="0"/>
-          <xs:element ref="pc:EntityId1" minOccurs="0"/>
-          <xs:element ref="pc:EntityId2" minOccurs="0"/>
-          <xs:element ref="pc:EntityId3" minOccurs="0"/>
-          <xs:element ref="pc:EntityId4" minOccurs="0"/>
-          <xs:element ref="pc:EntityId5" minOccurs="0"/>
-        </xs:sequence>
-      </xs:complexType>
-    </xs:element>
-    <xs:element name="EntityDisplayName" type="xs:string"/>
-    <xs:element name="EntityInstanceReference" type="xs:string"/>
-    <xs:element name="EntityId1" type="xs:string"/>
-    <xs:element name="EntityId2" type="xs:string"/>
-    <xs:element name="EntityId3" type="xs:string"/>
-    <xs:element name="EntityId4" type="xs:string"/>
-    <xs:element name="EntityId5" type="xs:string"/>
-    <xs:element name="Terms">
-      <xs:complexType>
-        <xs:sequence>
-          <xs:element ref="pc:TermInfo" minOccurs="0" maxOccurs="unbounded"/>
-        </xs:sequence>
-      </xs:complexType>
-    </xs:element>
-    <xs:element name="TermInfo">
-      <xs:complexType>
-        <xs:sequence>
-          <xs:element ref="pc:TermName" minOccurs="0"/>
-          <xs:element ref="pc:TermId" minOccurs="0"/>
-        </xs:sequence>
-      </xs:complexType>
-    </xs:element>
-    <xs:element name="TermName" type="xs:string"/>
-    <xs:element name="TermId" type="xs:string"/>
-  </xs:schema>
-</ct:contentTypeSchema>
-</file>
-
-<file path=customXml/itemProps1.xml><?xml version="1.0" encoding="utf-8"?>
-<ds:datastoreItem xmlns:ds="http://schemas.openxmlformats.org/officeDocument/2006/customXml" ds:itemID="{B8A34314-8D3A-452C-8AAA-D10D5B813375}">
-  <ds:schemaRefs>
-    <ds:schemaRef ds:uri="http://schemas.microsoft.com/sharepoint/v3/contenttype/forms"/>
-  </ds:schemaRefs>
-</ds:datastoreItem>
-</file>
-
-<file path=customXml/itemProps2.xml><?xml version="1.0" encoding="utf-8"?>
-<ds:datastoreItem xmlns:ds="http://schemas.openxmlformats.org/officeDocument/2006/customXml" ds:itemID="{04A1E988-5500-4BAB-A019-1D881A017DF6}">
-  <ds:schemaRefs>
-    <ds:schemaRef ds:uri="http://schemas.microsoft.com/office/2006/metadata/properties"/>
-    <ds:schemaRef ds:uri="http://schemas.microsoft.com/office/infopath/2007/PartnerControls"/>
-    <ds:schemaRef ds:uri="http://schemas.microsoft.com/sharepoint/v3"/>
-    <ds:schemaRef ds:uri="e23dce91-39c0-4252-99ce-6ae4777e2ffd"/>
-    <ds:schemaRef ds:uri="4976b90c-8cac-4291-9f3f-de6e12c75e01"/>
-    <ds:schemaRef ds:uri="7bfe81a0-25b1-4a1a-809f-421988818cd4"/>
-    <ds:schemaRef ds:uri="67d6ef92-78a9-460c-8610-2f58ea409e40"/>
-  </ds:schemaRefs>
-</ds:datastoreItem>
-</file>
-
-<file path=customXml/itemProps3.xml><?xml version="1.0" encoding="utf-8"?>
-<ds:datastoreItem xmlns:ds="http://schemas.openxmlformats.org/officeDocument/2006/customXml" ds:itemID="{BA5E5766-55E4-426C-A28B-C84599213E50}">
-  <ds:schemaRefs>
-    <ds:schemaRef ds:uri="http://schemas.microsoft.com/office/2006/metadata/contentType"/>
-    <ds:schemaRef ds:uri="http://schemas.microsoft.com/office/2006/metadata/properties/metaAttributes"/>
-    <ds:schemaRef ds:uri="http://www.w3.org/2001/XMLSchema"/>
-    <ds:schemaRef ds:uri="http://schemas.microsoft.com/office/2006/metadata/properties"/>
-    <ds:schemaRef ds:uri="http://schemas.microsoft.com/sharepoint/v3"/>
-    <ds:schemaRef ds:uri="7bfe81a0-25b1-4a1a-809f-421988818cd4"/>
-    <ds:schemaRef ds:uri="67d6ef92-78a9-460c-8610-2f58ea409e40"/>
-    <ds:schemaRef ds:uri="http://schemas.microsoft.com/office/2006/documentManagement/types"/>
-    <ds:schemaRef ds:uri="http://schemas.microsoft.com/office/infopath/2007/PartnerControls"/>
-    <ds:schemaRef ds:uri="http://schemas.openxmlformats.org/package/2006/metadata/core-properties"/>
-    <ds:schemaRef ds:uri="http://purl.org/dc/elements/1.1/"/>
-    <ds:schemaRef ds:uri="http://purl.org/dc/terms/"/>
-    <ds:schemaRef ds:uri="http://schemas.microsoft.com/internal/obd"/>
-  </ds:schemaRefs>
-</ds:datastoreItem>
-</file>
-
-<file path=docMetadata/LabelInfo.xml><?xml version="1.0" encoding="utf-8"?>
-<clbl:labelList xmlns:clbl="http://schemas.microsoft.com/office/2020/mipLabelMetadata">
-  <clbl:label id="{87867195-f2b8-4ac2-b0b6-6bb73cb33afc}" enabled="1" method="Privileged" siteId="{72f988bf-86f1-41af-91ab-2d7cd011db47}" contentBits="0" removed="0"/>
-</clbl:labelList>
 </file>
</xml_diff>